<commit_message>
Updating slide 6 features
</commit_message>
<xml_diff>
--- a/Petabyte Pirates.pptx
+++ b/Petabyte Pirates.pptx
@@ -2151,9 +2151,9 @@
     <dgm:cxn modelId="{0224EB1A-9AF9-41B5-9927-0363B306A192}" type="presOf" srcId="{8ABAB5FB-26B5-4029-B918-F4E23B7FCD22}" destId="{C0BFD27A-0820-474D-9B58-0E907D39BF43}" srcOrd="0" destOrd="0" presId="urn:microsoft.com/office/officeart/2005/8/layout/vList5"/>
     <dgm:cxn modelId="{FE8C2333-3546-4193-B13A-281D824107F8}" srcId="{8ABAB5FB-26B5-4029-B918-F4E23B7FCD22}" destId="{4D38DDA3-070A-4135-8298-BF3475077549}" srcOrd="2" destOrd="0" parTransId="{092CF4F5-B4A4-4384-A3AF-78D62D79FD7F}" sibTransId="{3265ED6B-0A45-42EA-A133-1008832419E6}"/>
     <dgm:cxn modelId="{B1A15F3E-4834-4EB6-A05F-38AF86202287}" type="presOf" srcId="{CCAC5222-A613-4E15-8546-296F5C98AEFF}" destId="{4DC8C6CD-4A4A-4C00-8D18-8E2CC7C70E7A}" srcOrd="0" destOrd="0" presId="urn:microsoft.com/office/officeart/2005/8/layout/vList5"/>
-    <dgm:cxn modelId="{D9E90E61-64AB-4CEC-93CB-0258EF864616}" type="presOf" srcId="{9AC471E7-6965-4FD0-85F0-AA4B3DEE53D9}" destId="{799EB899-16B5-4DF0-BD54-8AEFA5EF4735}" srcOrd="0" destOrd="4" presId="urn:microsoft.com/office/officeart/2005/8/layout/vList5"/>
     <dgm:cxn modelId="{C5A59241-8547-435E-BF37-C96A86B95FBA}" type="presOf" srcId="{F25DD8B4-520E-4135-AA1D-A2623232AB6E}" destId="{F085642B-E7D8-4B2E-A09E-86186F2B7DA7}" srcOrd="0" destOrd="0" presId="urn:microsoft.com/office/officeart/2005/8/layout/vList5"/>
     <dgm:cxn modelId="{94208845-1F90-4E6B-8E53-2BA135C195DD}" type="presOf" srcId="{4D38DDA3-070A-4135-8298-BF3475077549}" destId="{799EB899-16B5-4DF0-BD54-8AEFA5EF4735}" srcOrd="0" destOrd="2" presId="urn:microsoft.com/office/officeart/2005/8/layout/vList5"/>
+    <dgm:cxn modelId="{D9E90E61-64AB-4CEC-93CB-0258EF864616}" type="presOf" srcId="{9AC471E7-6965-4FD0-85F0-AA4B3DEE53D9}" destId="{799EB899-16B5-4DF0-BD54-8AEFA5EF4735}" srcOrd="0" destOrd="4" presId="urn:microsoft.com/office/officeart/2005/8/layout/vList5"/>
     <dgm:cxn modelId="{EF2EE877-28B9-4DB9-929D-5FE8DD448142}" type="presOf" srcId="{7BE53DC9-BFCD-4002-A129-3EDB477B4EE2}" destId="{799EB899-16B5-4DF0-BD54-8AEFA5EF4735}" srcOrd="0" destOrd="0" presId="urn:microsoft.com/office/officeart/2005/8/layout/vList5"/>
     <dgm:cxn modelId="{45521C8B-5E60-4E31-ACA0-02826AC7B967}" srcId="{CCAC5222-A613-4E15-8546-296F5C98AEFF}" destId="{97F3F97E-5E35-43CE-892D-82E10EB4E0F5}" srcOrd="0" destOrd="0" parTransId="{1019F09C-C02C-4A11-9C12-49CF0856922C}" sibTransId="{2D07A651-0254-4FA9-AF6F-0ED8A66259BD}"/>
     <dgm:cxn modelId="{01F70191-F7C2-47C8-A98F-BD9A24029850}" type="presOf" srcId="{3B74D6AB-AD31-40AC-B54F-6289F189EB0A}" destId="{799EB899-16B5-4DF0-BD54-8AEFA5EF4735}" srcOrd="0" destOrd="3" presId="urn:microsoft.com/office/officeart/2005/8/layout/vList5"/>
@@ -5851,7 +5851,7 @@
           <a:p>
             <a:fld id="{D900DB5A-B4C6-47BD-B3A5-6F5ED2310554}" type="datetimeFigureOut">
               <a:rPr lang="en-US" smtClean="0"/>
-              <a:t>7/13/2025</a:t>
+              <a:t>7/13/25</a:t>
             </a:fld>
             <a:endParaRPr lang="en-US"/>
           </a:p>
@@ -6049,7 +6049,7 @@
           <a:p>
             <a:fld id="{D900DB5A-B4C6-47BD-B3A5-6F5ED2310554}" type="datetimeFigureOut">
               <a:rPr lang="en-US" smtClean="0"/>
-              <a:t>7/13/2025</a:t>
+              <a:t>7/13/25</a:t>
             </a:fld>
             <a:endParaRPr lang="en-US"/>
           </a:p>
@@ -6257,7 +6257,7 @@
           <a:p>
             <a:fld id="{D900DB5A-B4C6-47BD-B3A5-6F5ED2310554}" type="datetimeFigureOut">
               <a:rPr lang="en-US" smtClean="0"/>
-              <a:t>7/13/2025</a:t>
+              <a:t>7/13/25</a:t>
             </a:fld>
             <a:endParaRPr lang="en-US"/>
           </a:p>
@@ -6455,7 +6455,7 @@
           <a:p>
             <a:fld id="{D900DB5A-B4C6-47BD-B3A5-6F5ED2310554}" type="datetimeFigureOut">
               <a:rPr lang="en-US" smtClean="0"/>
-              <a:t>7/13/2025</a:t>
+              <a:t>7/13/25</a:t>
             </a:fld>
             <a:endParaRPr lang="en-US"/>
           </a:p>
@@ -6730,7 +6730,7 @@
           <a:p>
             <a:fld id="{D900DB5A-B4C6-47BD-B3A5-6F5ED2310554}" type="datetimeFigureOut">
               <a:rPr lang="en-US" smtClean="0"/>
-              <a:t>7/13/2025</a:t>
+              <a:t>7/13/25</a:t>
             </a:fld>
             <a:endParaRPr lang="en-US"/>
           </a:p>
@@ -6995,7 +6995,7 @@
           <a:p>
             <a:fld id="{D900DB5A-B4C6-47BD-B3A5-6F5ED2310554}" type="datetimeFigureOut">
               <a:rPr lang="en-US" smtClean="0"/>
-              <a:t>7/13/2025</a:t>
+              <a:t>7/13/25</a:t>
             </a:fld>
             <a:endParaRPr lang="en-US"/>
           </a:p>
@@ -7407,7 +7407,7 @@
           <a:p>
             <a:fld id="{D900DB5A-B4C6-47BD-B3A5-6F5ED2310554}" type="datetimeFigureOut">
               <a:rPr lang="en-US" smtClean="0"/>
-              <a:t>7/13/2025</a:t>
+              <a:t>7/13/25</a:t>
             </a:fld>
             <a:endParaRPr lang="en-US"/>
           </a:p>
@@ -7548,7 +7548,7 @@
           <a:p>
             <a:fld id="{D900DB5A-B4C6-47BD-B3A5-6F5ED2310554}" type="datetimeFigureOut">
               <a:rPr lang="en-US" smtClean="0"/>
-              <a:t>7/13/2025</a:t>
+              <a:t>7/13/25</a:t>
             </a:fld>
             <a:endParaRPr lang="en-US"/>
           </a:p>
@@ -7661,7 +7661,7 @@
           <a:p>
             <a:fld id="{D900DB5A-B4C6-47BD-B3A5-6F5ED2310554}" type="datetimeFigureOut">
               <a:rPr lang="en-US" smtClean="0"/>
-              <a:t>7/13/2025</a:t>
+              <a:t>7/13/25</a:t>
             </a:fld>
             <a:endParaRPr lang="en-US"/>
           </a:p>
@@ -7972,7 +7972,7 @@
           <a:p>
             <a:fld id="{D900DB5A-B4C6-47BD-B3A5-6F5ED2310554}" type="datetimeFigureOut">
               <a:rPr lang="en-US" smtClean="0"/>
-              <a:t>7/13/2025</a:t>
+              <a:t>7/13/25</a:t>
             </a:fld>
             <a:endParaRPr lang="en-US"/>
           </a:p>
@@ -8260,7 +8260,7 @@
           <a:p>
             <a:fld id="{D900DB5A-B4C6-47BD-B3A5-6F5ED2310554}" type="datetimeFigureOut">
               <a:rPr lang="en-US" smtClean="0"/>
-              <a:t>7/13/2025</a:t>
+              <a:t>7/13/25</a:t>
             </a:fld>
             <a:endParaRPr lang="en-US"/>
           </a:p>
@@ -8501,7 +8501,7 @@
           <a:p>
             <a:fld id="{D900DB5A-B4C6-47BD-B3A5-6F5ED2310554}" type="datetimeFigureOut">
               <a:rPr lang="en-US" smtClean="0"/>
-              <a:t>7/13/2025</a:t>
+              <a:t>7/13/25</a:t>
             </a:fld>
             <a:endParaRPr lang="en-US"/>
           </a:p>
@@ -11484,12 +11484,12 @@
           <a:lstStyle/>
           <a:p>
             <a:r>
-              <a:rPr lang="en-US">
+              <a:rPr lang="en-US" dirty="0">
                 <a:solidFill>
                   <a:srgbClr val="FFFFFF"/>
                 </a:solidFill>
               </a:rPr>
-              <a:t>Features</a:t>
+              <a:t>Features in Final Data Frame</a:t>
             </a:r>
           </a:p>
         </p:txBody>
@@ -11557,187 +11557,504 @@
       </p:sp>
       <p:sp>
         <p:nvSpPr>
-          <p:cNvPr id="3" name="Content Placeholder 2">
+          <p:cNvPr id="4" name="Rounded Rectangle 3">
             <a:extLst>
               <a:ext uri="{FF2B5EF4-FFF2-40B4-BE49-F238E27FC236}">
-                <a16:creationId xmlns:a16="http://schemas.microsoft.com/office/drawing/2014/main" id="{A0BA163A-D9FA-3D89-3D2D-03AC273218C8}"/>
+                <a16:creationId xmlns:a16="http://schemas.microsoft.com/office/drawing/2014/main" id="{85DC90AD-E6D1-B73C-2CC5-9607A9F224C9}"/>
               </a:ext>
             </a:extLst>
           </p:cNvPr>
-          <p:cNvSpPr>
-            <a:spLocks noGrp="1"/>
-          </p:cNvSpPr>
-          <p:nvPr>
-            <p:ph idx="1"/>
-          </p:nvPr>
+          <p:cNvSpPr/>
+          <p:nvPr/>
         </p:nvSpPr>
         <p:spPr>
           <a:xfrm>
-            <a:off x="4447308" y="591344"/>
-            <a:ext cx="6906491" cy="5585619"/>
+            <a:off x="4671682" y="58478"/>
+            <a:ext cx="2682945" cy="3136605"/>
           </a:xfrm>
+          <a:prstGeom prst="roundRect">
+            <a:avLst/>
+          </a:prstGeom>
+          <a:solidFill>
+            <a:schemeClr val="accent6"/>
+          </a:solidFill>
+          <a:ln>
+            <a:solidFill>
+              <a:schemeClr val="bg1"/>
+            </a:solidFill>
+          </a:ln>
         </p:spPr>
+        <p:style>
+          <a:lnRef idx="2">
+            <a:schemeClr val="accent1">
+              <a:shade val="15000"/>
+            </a:schemeClr>
+          </a:lnRef>
+          <a:fillRef idx="1">
+            <a:schemeClr val="accent1"/>
+          </a:fillRef>
+          <a:effectRef idx="0">
+            <a:schemeClr val="accent1"/>
+          </a:effectRef>
+          <a:fontRef idx="minor">
+            <a:schemeClr val="lt1"/>
+          </a:fontRef>
+        </p:style>
         <p:txBody>
-          <a:bodyPr anchor="ctr">
-            <a:normAutofit/>
-          </a:bodyPr>
+          <a:bodyPr rtlCol="0" anchor="t"/>
           <a:lstStyle/>
           <a:p>
+            <a:pPr algn="ctr"/>
             <a:r>
-              <a:rPr lang="en-US" sz="1000" dirty="0"/>
-              <a:t>Identified 21 features</a:t>
+              <a:rPr lang="en-US" sz="1400" dirty="0"/>
+              <a:t>Retained 13 Raw Features</a:t>
             </a:r>
           </a:p>
           <a:p>
-            <a:pPr lvl="1"/>
+            <a:pPr marL="285750" indent="-285750">
+              <a:buFont typeface="Arial" panose="020B0604020202020204" pitchFamily="34" charset="0"/>
+              <a:buChar char="•"/>
+            </a:pPr>
             <a:r>
-              <a:rPr lang="en-US" sz="1000" dirty="0"/>
+              <a:rPr lang="en-US" sz="1200" dirty="0"/>
+              <a:t>MS </a:t>
+            </a:r>
+            <a:r>
+              <a:rPr lang="en-US" sz="1200" dirty="0" err="1"/>
+              <a:t>SubClass</a:t>
+            </a:r>
+            <a:endParaRPr lang="en-US" sz="1200" dirty="0"/>
+          </a:p>
+          <a:p>
+            <a:pPr marL="285750" indent="-285750">
+              <a:buFont typeface="Arial" panose="020B0604020202020204" pitchFamily="34" charset="0"/>
+              <a:buChar char="•"/>
+            </a:pPr>
+            <a:r>
+              <a:rPr lang="en-US" sz="1200" dirty="0"/>
               <a:t>Overall Quality</a:t>
             </a:r>
           </a:p>
           <a:p>
-            <a:pPr lvl="1"/>
+            <a:pPr marL="285750" indent="-285750">
+              <a:buFont typeface="Arial" panose="020B0604020202020204" pitchFamily="34" charset="0"/>
+              <a:buChar char="•"/>
+            </a:pPr>
             <a:r>
-              <a:rPr lang="en-US" sz="1000" dirty="0"/>
+              <a:rPr lang="en-US" sz="1200" dirty="0"/>
               <a:t>Year Built</a:t>
             </a:r>
           </a:p>
           <a:p>
-            <a:pPr lvl="1"/>
+            <a:pPr marL="285750" indent="-285750">
+              <a:buFont typeface="Arial" panose="020B0604020202020204" pitchFamily="34" charset="0"/>
+              <a:buChar char="•"/>
+            </a:pPr>
             <a:r>
-              <a:rPr lang="en-US" sz="1000" dirty="0"/>
-              <a:t>Year remodeled/addition</a:t>
+              <a:rPr lang="en-US" sz="1200" dirty="0"/>
+              <a:t>Year Remod/Add</a:t>
             </a:r>
           </a:p>
           <a:p>
-            <a:pPr lvl="1"/>
+            <a:pPr marL="285750" indent="-285750">
+              <a:buFont typeface="Arial" panose="020B0604020202020204" pitchFamily="34" charset="0"/>
+              <a:buChar char="•"/>
+            </a:pPr>
             <a:r>
-              <a:rPr lang="en-US" sz="1000" dirty="0"/>
-              <a:t>Total Basement SF</a:t>
+              <a:rPr lang="en-US" sz="1200" dirty="0"/>
+              <a:t>Basement Finishings</a:t>
             </a:r>
           </a:p>
           <a:p>
-            <a:pPr lvl="1"/>
+            <a:pPr marL="285750" indent="-285750">
+              <a:buFont typeface="Arial" panose="020B0604020202020204" pitchFamily="34" charset="0"/>
+              <a:buChar char="•"/>
+            </a:pPr>
             <a:r>
-              <a:rPr lang="en-US" sz="1000" dirty="0"/>
-              <a:t>First Floor SF</a:t>
+              <a:rPr lang="en-US" sz="1200" dirty="0"/>
+              <a:t>Total Basement Square Feet</a:t>
             </a:r>
           </a:p>
           <a:p>
-            <a:pPr lvl="1"/>
+            <a:pPr marL="285750" indent="-285750">
+              <a:buFont typeface="Arial" panose="020B0604020202020204" pitchFamily="34" charset="0"/>
+              <a:buChar char="•"/>
+            </a:pPr>
             <a:r>
-              <a:rPr lang="en-US" sz="1000" dirty="0"/>
-              <a:t>Above Grade Living Area SF</a:t>
+              <a:rPr lang="en-US" sz="1200" dirty="0"/>
+              <a:t>First Floor Square Feet</a:t>
             </a:r>
           </a:p>
           <a:p>
-            <a:pPr lvl="1"/>
+            <a:pPr marL="285750" indent="-285750">
+              <a:buFont typeface="Arial" panose="020B0604020202020204" pitchFamily="34" charset="0"/>
+              <a:buChar char="•"/>
+            </a:pPr>
             <a:r>
-              <a:rPr lang="en-US" sz="1000" dirty="0"/>
-              <a:t>Full Baths</a:t>
+              <a:rPr lang="en-US" sz="1200" dirty="0"/>
+              <a:t>Above Ground Living Area</a:t>
             </a:r>
           </a:p>
           <a:p>
-            <a:pPr lvl="1"/>
+            <a:pPr marL="285750" indent="-285750">
+              <a:buFont typeface="Arial" panose="020B0604020202020204" pitchFamily="34" charset="0"/>
+              <a:buChar char="•"/>
+            </a:pPr>
             <a:r>
-              <a:rPr lang="en-US" sz="1000" dirty="0"/>
+              <a:rPr lang="en-US" sz="1200" dirty="0"/>
+              <a:t>Number of Full Baths</a:t>
+            </a:r>
+          </a:p>
+          <a:p>
+            <a:pPr marL="285750" indent="-285750">
+              <a:buFont typeface="Arial" panose="020B0604020202020204" pitchFamily="34" charset="0"/>
+              <a:buChar char="•"/>
+            </a:pPr>
+            <a:r>
+              <a:rPr lang="en-US" sz="1200" dirty="0"/>
               <a:t>Garage Year Built</a:t>
             </a:r>
           </a:p>
           <a:p>
-            <a:pPr lvl="1"/>
+            <a:pPr marL="285750" indent="-285750">
+              <a:buFont typeface="Arial" panose="020B0604020202020204" pitchFamily="34" charset="0"/>
+              <a:buChar char="•"/>
+            </a:pPr>
             <a:r>
-              <a:rPr lang="en-US" sz="1000" dirty="0"/>
+              <a:rPr lang="en-US" sz="1200" dirty="0"/>
+              <a:t>Garage Finishings</a:t>
+            </a:r>
+          </a:p>
+          <a:p>
+            <a:pPr marL="285750" indent="-285750">
+              <a:buFont typeface="Arial" panose="020B0604020202020204" pitchFamily="34" charset="0"/>
+              <a:buChar char="•"/>
+            </a:pPr>
+            <a:r>
+              <a:rPr lang="en-US" sz="1200" dirty="0"/>
               <a:t>Garage Cars</a:t>
             </a:r>
           </a:p>
           <a:p>
-            <a:pPr lvl="1"/>
+            <a:pPr marL="285750" indent="-285750">
+              <a:buFont typeface="Arial" panose="020B0604020202020204" pitchFamily="34" charset="0"/>
+              <a:buChar char="•"/>
+            </a:pPr>
             <a:r>
-              <a:rPr lang="en-US" sz="1000" dirty="0"/>
+              <a:rPr lang="en-US" sz="1200" dirty="0"/>
               <a:t>Garage Area</a:t>
             </a:r>
           </a:p>
-          <a:p>
-            <a:pPr lvl="1"/>
+        </p:txBody>
+      </p:sp>
+      <p:sp>
+        <p:nvSpPr>
+          <p:cNvPr id="8" name="Rounded Rectangle 7">
+            <a:extLst>
+              <a:ext uri="{FF2B5EF4-FFF2-40B4-BE49-F238E27FC236}">
+                <a16:creationId xmlns:a16="http://schemas.microsoft.com/office/drawing/2014/main" id="{4D2689CA-3581-E5D2-17DC-78805BD103BB}"/>
+              </a:ext>
+            </a:extLst>
+          </p:cNvPr>
+          <p:cNvSpPr/>
+          <p:nvPr/>
+        </p:nvSpPr>
+        <p:spPr>
+          <a:xfrm>
+            <a:off x="7859037" y="2502638"/>
+            <a:ext cx="2682945" cy="1852723"/>
+          </a:xfrm>
+          <a:prstGeom prst="roundRect">
+            <a:avLst/>
+          </a:prstGeom>
+          <a:solidFill>
+            <a:schemeClr val="accent6"/>
+          </a:solidFill>
+          <a:ln>
+            <a:solidFill>
+              <a:schemeClr val="bg1"/>
+            </a:solidFill>
+          </a:ln>
+        </p:spPr>
+        <p:style>
+          <a:lnRef idx="2">
+            <a:schemeClr val="accent1">
+              <a:shade val="15000"/>
+            </a:schemeClr>
+          </a:lnRef>
+          <a:fillRef idx="1">
+            <a:schemeClr val="accent1"/>
+          </a:fillRef>
+          <a:effectRef idx="0">
+            <a:schemeClr val="accent1"/>
+          </a:effectRef>
+          <a:fontRef idx="minor">
+            <a:schemeClr val="lt1"/>
+          </a:fontRef>
+        </p:style>
+        <p:txBody>
+          <a:bodyPr rtlCol="0" anchor="t"/>
+          <a:lstStyle/>
+          <a:p>
+            <a:pPr algn="ctr"/>
             <a:r>
-              <a:rPr lang="en-US" sz="1000" dirty="0"/>
-              <a:t>House Age</a:t>
+              <a:rPr lang="en-US" sz="1400" dirty="0"/>
+              <a:t>Encoded 6 Features w/ Ordinal Mapping</a:t>
             </a:r>
           </a:p>
           <a:p>
-            <a:pPr lvl="1"/>
+            <a:pPr marL="285750" indent="-285750">
+              <a:buFont typeface="Arial" panose="020B0604020202020204" pitchFamily="34" charset="0"/>
+              <a:buChar char="•"/>
+            </a:pPr>
             <a:r>
-              <a:rPr lang="en-US" sz="1000" dirty="0"/>
-              <a:t>Remodel Age</a:t>
-            </a:r>
-          </a:p>
-          <a:p>
-            <a:pPr lvl="1"/>
-            <a:r>
-              <a:rPr lang="en-US" sz="1000" dirty="0"/>
-              <a:t>Total SF</a:t>
-            </a:r>
-          </a:p>
-          <a:p>
-            <a:pPr lvl="1"/>
-            <a:r>
-              <a:rPr lang="en-US" sz="1000" dirty="0"/>
-              <a:t>Total SF plus Garage</a:t>
-            </a:r>
-          </a:p>
-          <a:p>
-            <a:pPr lvl="1"/>
-            <a:r>
-              <a:rPr lang="en-US" sz="1000" dirty="0"/>
-              <a:t>Total Baths</a:t>
-            </a:r>
-          </a:p>
-          <a:p>
-            <a:pPr lvl="1"/>
-            <a:r>
-              <a:rPr lang="en-US" sz="1000" dirty="0"/>
-              <a:t>Price per Square Foot</a:t>
-            </a:r>
-          </a:p>
-          <a:p>
-            <a:pPr lvl="1"/>
-            <a:r>
-              <a:rPr lang="en-US" sz="1000" dirty="0"/>
-              <a:t>Quality X Square Foot</a:t>
-            </a:r>
-          </a:p>
-          <a:p>
-            <a:pPr lvl="1"/>
-            <a:r>
-              <a:rPr lang="en-US" sz="1000" dirty="0"/>
+              <a:rPr lang="en-US" sz="1200" dirty="0"/>
               <a:t>Exterior Quality</a:t>
             </a:r>
           </a:p>
           <a:p>
-            <a:pPr lvl="1"/>
+            <a:pPr marL="285750" indent="-285750">
+              <a:buFont typeface="Arial" panose="020B0604020202020204" pitchFamily="34" charset="0"/>
+              <a:buChar char="•"/>
+            </a:pPr>
             <a:r>
-              <a:rPr lang="en-US" sz="1000" dirty="0"/>
+              <a:rPr lang="en-US" sz="1200" dirty="0"/>
               <a:t>Basement Quality</a:t>
             </a:r>
           </a:p>
           <a:p>
-            <a:pPr lvl="1"/>
+            <a:pPr marL="285750" indent="-285750">
+              <a:buFont typeface="Arial" panose="020B0604020202020204" pitchFamily="34" charset="0"/>
+              <a:buChar char="•"/>
+            </a:pPr>
             <a:r>
-              <a:rPr lang="en-US" sz="1000" dirty="0"/>
+              <a:rPr lang="en-US" sz="1200" dirty="0"/>
+              <a:t>Heating Quality</a:t>
+            </a:r>
+          </a:p>
+          <a:p>
+            <a:pPr marL="285750" indent="-285750">
+              <a:buFont typeface="Arial" panose="020B0604020202020204" pitchFamily="34" charset="0"/>
+              <a:buChar char="•"/>
+            </a:pPr>
+            <a:r>
+              <a:rPr lang="en-US" sz="1200" dirty="0"/>
               <a:t>Kitchen Quality</a:t>
             </a:r>
           </a:p>
           <a:p>
-            <a:pPr lvl="1"/>
+            <a:pPr marL="285750" indent="-285750">
+              <a:buFont typeface="Arial" panose="020B0604020202020204" pitchFamily="34" charset="0"/>
+              <a:buChar char="•"/>
+            </a:pPr>
             <a:r>
-              <a:rPr lang="en-US" sz="1000" dirty="0"/>
+              <a:rPr lang="en-US" sz="1200" dirty="0"/>
               <a:t>Fireplace Quality</a:t>
             </a:r>
           </a:p>
           <a:p>
-            <a:pPr lvl="1"/>
-            <a:endParaRPr lang="en-US" sz="1000" dirty="0"/>
+            <a:pPr marL="285750" indent="-285750">
+              <a:buFont typeface="Arial" panose="020B0604020202020204" pitchFamily="34" charset="0"/>
+              <a:buChar char="•"/>
+            </a:pPr>
+            <a:r>
+              <a:rPr lang="en-US" sz="1200" dirty="0"/>
+              <a:t>Functional</a:t>
+            </a:r>
+          </a:p>
+        </p:txBody>
+      </p:sp>
+      <p:sp>
+        <p:nvSpPr>
+          <p:cNvPr id="9" name="Rounded Rectangle 8">
+            <a:extLst>
+              <a:ext uri="{FF2B5EF4-FFF2-40B4-BE49-F238E27FC236}">
+                <a16:creationId xmlns:a16="http://schemas.microsoft.com/office/drawing/2014/main" id="{F8B1B0B0-8B1A-B4C0-5A8B-5680479C57CF}"/>
+              </a:ext>
+            </a:extLst>
+          </p:cNvPr>
+          <p:cNvSpPr/>
+          <p:nvPr/>
+        </p:nvSpPr>
+        <p:spPr>
+          <a:xfrm>
+            <a:off x="4675226" y="3428999"/>
+            <a:ext cx="2682945" cy="3136605"/>
+          </a:xfrm>
+          <a:prstGeom prst="roundRect">
+            <a:avLst/>
+          </a:prstGeom>
+          <a:solidFill>
+            <a:schemeClr val="accent6"/>
+          </a:solidFill>
+          <a:ln>
+            <a:solidFill>
+              <a:schemeClr val="bg1"/>
+            </a:solidFill>
+          </a:ln>
+        </p:spPr>
+        <p:style>
+          <a:lnRef idx="2">
+            <a:schemeClr val="accent1">
+              <a:shade val="15000"/>
+            </a:schemeClr>
+          </a:lnRef>
+          <a:fillRef idx="1">
+            <a:schemeClr val="accent1"/>
+          </a:fillRef>
+          <a:effectRef idx="0">
+            <a:schemeClr val="accent1"/>
+          </a:effectRef>
+          <a:fontRef idx="minor">
+            <a:schemeClr val="lt1"/>
+          </a:fontRef>
+        </p:style>
+        <p:txBody>
+          <a:bodyPr rtlCol="0" anchor="t"/>
+          <a:lstStyle/>
+          <a:p>
+            <a:pPr algn="ctr"/>
+            <a:r>
+              <a:rPr lang="en-US" sz="1400" dirty="0"/>
+              <a:t>One-Hot Encoded 13 Features </a:t>
+            </a:r>
+          </a:p>
+          <a:p>
+            <a:pPr marL="285750" indent="-285750">
+              <a:buFont typeface="Arial" panose="020B0604020202020204" pitchFamily="34" charset="0"/>
+              <a:buChar char="•"/>
+            </a:pPr>
+            <a:r>
+              <a:rPr lang="en-US" sz="1200" dirty="0"/>
+              <a:t>Neighborhood</a:t>
+            </a:r>
+          </a:p>
+          <a:p>
+            <a:pPr marL="285750" indent="-285750">
+              <a:buFont typeface="Arial" panose="020B0604020202020204" pitchFamily="34" charset="0"/>
+              <a:buChar char="•"/>
+            </a:pPr>
+            <a:r>
+              <a:rPr lang="en-US" sz="1200" dirty="0"/>
+              <a:t>House Style</a:t>
+            </a:r>
+          </a:p>
+          <a:p>
+            <a:pPr marL="285750" indent="-285750">
+              <a:buFont typeface="Arial" panose="020B0604020202020204" pitchFamily="34" charset="0"/>
+              <a:buChar char="•"/>
+            </a:pPr>
+            <a:r>
+              <a:rPr lang="en-US" sz="1200" dirty="0"/>
+              <a:t>Building Type</a:t>
+            </a:r>
+          </a:p>
+          <a:p>
+            <a:pPr marL="285750" indent="-285750">
+              <a:buFont typeface="Arial" panose="020B0604020202020204" pitchFamily="34" charset="0"/>
+              <a:buChar char="•"/>
+            </a:pPr>
+            <a:r>
+              <a:rPr lang="en-US" sz="1200" dirty="0"/>
+              <a:t>Sale Condition</a:t>
+            </a:r>
+          </a:p>
+          <a:p>
+            <a:pPr marL="285750" indent="-285750">
+              <a:buFont typeface="Arial" panose="020B0604020202020204" pitchFamily="34" charset="0"/>
+              <a:buChar char="•"/>
+            </a:pPr>
+            <a:r>
+              <a:rPr lang="en-US" sz="1200" dirty="0"/>
+              <a:t>Sale Type</a:t>
+            </a:r>
+          </a:p>
+          <a:p>
+            <a:pPr marL="285750" indent="-285750">
+              <a:buFont typeface="Arial" panose="020B0604020202020204" pitchFamily="34" charset="0"/>
+              <a:buChar char="•"/>
+            </a:pPr>
+            <a:r>
+              <a:rPr lang="en-US" sz="1200" dirty="0"/>
+              <a:t>Garage Type</a:t>
+            </a:r>
+          </a:p>
+          <a:p>
+            <a:pPr marL="285750" indent="-285750">
+              <a:buFont typeface="Arial" panose="020B0604020202020204" pitchFamily="34" charset="0"/>
+              <a:buChar char="•"/>
+            </a:pPr>
+            <a:r>
+              <a:rPr lang="en-US" sz="1200" dirty="0"/>
+              <a:t>Foundation</a:t>
+            </a:r>
+          </a:p>
+          <a:p>
+            <a:pPr marL="285750" indent="-285750">
+              <a:buFont typeface="Arial" panose="020B0604020202020204" pitchFamily="34" charset="0"/>
+              <a:buChar char="•"/>
+            </a:pPr>
+            <a:r>
+              <a:rPr lang="en-US" sz="1200" dirty="0"/>
+              <a:t>Exterior Primary Materials</a:t>
+            </a:r>
+          </a:p>
+          <a:p>
+            <a:pPr marL="285750" indent="-285750">
+              <a:buFont typeface="Arial" panose="020B0604020202020204" pitchFamily="34" charset="0"/>
+              <a:buChar char="•"/>
+            </a:pPr>
+            <a:r>
+              <a:rPr lang="en-US" sz="1200" dirty="0"/>
+              <a:t>Exterior Secondary Materials</a:t>
+            </a:r>
+          </a:p>
+          <a:p>
+            <a:pPr marL="285750" indent="-285750">
+              <a:buFont typeface="Arial" panose="020B0604020202020204" pitchFamily="34" charset="0"/>
+              <a:buChar char="•"/>
+            </a:pPr>
+            <a:r>
+              <a:rPr lang="en-US" sz="1200" dirty="0"/>
+              <a:t>MS Zoning</a:t>
+            </a:r>
+          </a:p>
+          <a:p>
+            <a:pPr marL="285750" indent="-285750">
+              <a:buFont typeface="Arial" panose="020B0604020202020204" pitchFamily="34" charset="0"/>
+              <a:buChar char="•"/>
+            </a:pPr>
+            <a:r>
+              <a:rPr lang="en-US" sz="1200" dirty="0"/>
+              <a:t>Lot Shape</a:t>
+            </a:r>
+          </a:p>
+          <a:p>
+            <a:pPr marL="285750" indent="-285750">
+              <a:buFont typeface="Arial" panose="020B0604020202020204" pitchFamily="34" charset="0"/>
+              <a:buChar char="•"/>
+            </a:pPr>
+            <a:r>
+              <a:rPr lang="en-US" sz="1200" dirty="0"/>
+              <a:t>Lot Config</a:t>
+            </a:r>
+          </a:p>
+          <a:p>
+            <a:pPr marL="285750" indent="-285750">
+              <a:buFont typeface="Arial" panose="020B0604020202020204" pitchFamily="34" charset="0"/>
+              <a:buChar char="•"/>
+            </a:pPr>
+            <a:r>
+              <a:rPr lang="en-US" sz="1200" dirty="0"/>
+              <a:t>Primary Condition</a:t>
+            </a:r>
+          </a:p>
+          <a:p>
+            <a:pPr marL="285750" indent="-285750">
+              <a:buFont typeface="Arial" panose="020B0604020202020204" pitchFamily="34" charset="0"/>
+              <a:buChar char="•"/>
+            </a:pPr>
+            <a:endParaRPr lang="en-US" sz="1200" dirty="0"/>
           </a:p>
         </p:txBody>
       </p:sp>

</xml_diff>

<commit_message>
More features in preso.
</commit_message>
<xml_diff>
--- a/Petabyte Pirates.pptx
+++ b/Petabyte Pirates.pptx
@@ -11569,7 +11569,7 @@
         </p:nvSpPr>
         <p:spPr>
           <a:xfrm>
-            <a:off x="4671682" y="58478"/>
+            <a:off x="4305748" y="58478"/>
             <a:ext cx="2682945" cy="3136605"/>
           </a:xfrm>
           <a:prstGeom prst="roundRect">
@@ -11761,124 +11761,7 @@
         </p:nvSpPr>
         <p:spPr>
           <a:xfrm>
-            <a:off x="7859037" y="2502638"/>
-            <a:ext cx="2682945" cy="1852723"/>
-          </a:xfrm>
-          <a:prstGeom prst="roundRect">
-            <a:avLst/>
-          </a:prstGeom>
-          <a:solidFill>
-            <a:schemeClr val="accent6"/>
-          </a:solidFill>
-          <a:ln>
-            <a:solidFill>
-              <a:schemeClr val="bg1"/>
-            </a:solidFill>
-          </a:ln>
-        </p:spPr>
-        <p:style>
-          <a:lnRef idx="2">
-            <a:schemeClr val="accent1">
-              <a:shade val="15000"/>
-            </a:schemeClr>
-          </a:lnRef>
-          <a:fillRef idx="1">
-            <a:schemeClr val="accent1"/>
-          </a:fillRef>
-          <a:effectRef idx="0">
-            <a:schemeClr val="accent1"/>
-          </a:effectRef>
-          <a:fontRef idx="minor">
-            <a:schemeClr val="lt1"/>
-          </a:fontRef>
-        </p:style>
-        <p:txBody>
-          <a:bodyPr rtlCol="0" anchor="t"/>
-          <a:lstStyle/>
-          <a:p>
-            <a:pPr algn="ctr"/>
-            <a:r>
-              <a:rPr lang="en-US" sz="1400" dirty="0"/>
-              <a:t>Encoded 6 Features w/ Ordinal Mapping</a:t>
-            </a:r>
-          </a:p>
-          <a:p>
-            <a:pPr marL="285750" indent="-285750">
-              <a:buFont typeface="Arial" panose="020B0604020202020204" pitchFamily="34" charset="0"/>
-              <a:buChar char="•"/>
-            </a:pPr>
-            <a:r>
-              <a:rPr lang="en-US" sz="1200" dirty="0"/>
-              <a:t>Exterior Quality</a:t>
-            </a:r>
-          </a:p>
-          <a:p>
-            <a:pPr marL="285750" indent="-285750">
-              <a:buFont typeface="Arial" panose="020B0604020202020204" pitchFamily="34" charset="0"/>
-              <a:buChar char="•"/>
-            </a:pPr>
-            <a:r>
-              <a:rPr lang="en-US" sz="1200" dirty="0"/>
-              <a:t>Basement Quality</a:t>
-            </a:r>
-          </a:p>
-          <a:p>
-            <a:pPr marL="285750" indent="-285750">
-              <a:buFont typeface="Arial" panose="020B0604020202020204" pitchFamily="34" charset="0"/>
-              <a:buChar char="•"/>
-            </a:pPr>
-            <a:r>
-              <a:rPr lang="en-US" sz="1200" dirty="0"/>
-              <a:t>Heating Quality</a:t>
-            </a:r>
-          </a:p>
-          <a:p>
-            <a:pPr marL="285750" indent="-285750">
-              <a:buFont typeface="Arial" panose="020B0604020202020204" pitchFamily="34" charset="0"/>
-              <a:buChar char="•"/>
-            </a:pPr>
-            <a:r>
-              <a:rPr lang="en-US" sz="1200" dirty="0"/>
-              <a:t>Kitchen Quality</a:t>
-            </a:r>
-          </a:p>
-          <a:p>
-            <a:pPr marL="285750" indent="-285750">
-              <a:buFont typeface="Arial" panose="020B0604020202020204" pitchFamily="34" charset="0"/>
-              <a:buChar char="•"/>
-            </a:pPr>
-            <a:r>
-              <a:rPr lang="en-US" sz="1200" dirty="0"/>
-              <a:t>Fireplace Quality</a:t>
-            </a:r>
-          </a:p>
-          <a:p>
-            <a:pPr marL="285750" indent="-285750">
-              <a:buFont typeface="Arial" panose="020B0604020202020204" pitchFamily="34" charset="0"/>
-              <a:buChar char="•"/>
-            </a:pPr>
-            <a:r>
-              <a:rPr lang="en-US" sz="1200" dirty="0"/>
-              <a:t>Functional</a:t>
-            </a:r>
-          </a:p>
-        </p:txBody>
-      </p:sp>
-      <p:sp>
-        <p:nvSpPr>
-          <p:cNvPr id="9" name="Rounded Rectangle 8">
-            <a:extLst>
-              <a:ext uri="{FF2B5EF4-FFF2-40B4-BE49-F238E27FC236}">
-                <a16:creationId xmlns:a16="http://schemas.microsoft.com/office/drawing/2014/main" id="{F8B1B0B0-8B1A-B4C0-5A8B-5680479C57CF}"/>
-              </a:ext>
-            </a:extLst>
-          </p:cNvPr>
-          <p:cNvSpPr/>
-          <p:nvPr/>
-        </p:nvSpPr>
-        <p:spPr>
-          <a:xfrm>
-            <a:off x="4675226" y="3428999"/>
+            <a:off x="7270702" y="58478"/>
             <a:ext cx="2682945" cy="3136605"/>
           </a:xfrm>
           <a:prstGeom prst="roundRect">
@@ -11916,6 +11799,123 @@
             <a:pPr algn="ctr"/>
             <a:r>
               <a:rPr lang="en-US" sz="1400" dirty="0"/>
+              <a:t>Encoded 6 Features w/ Ordinal Mapping</a:t>
+            </a:r>
+          </a:p>
+          <a:p>
+            <a:pPr marL="285750" indent="-285750">
+              <a:buFont typeface="Arial" panose="020B0604020202020204" pitchFamily="34" charset="0"/>
+              <a:buChar char="•"/>
+            </a:pPr>
+            <a:r>
+              <a:rPr lang="en-US" sz="1200" dirty="0"/>
+              <a:t>Exterior Quality</a:t>
+            </a:r>
+          </a:p>
+          <a:p>
+            <a:pPr marL="285750" indent="-285750">
+              <a:buFont typeface="Arial" panose="020B0604020202020204" pitchFamily="34" charset="0"/>
+              <a:buChar char="•"/>
+            </a:pPr>
+            <a:r>
+              <a:rPr lang="en-US" sz="1200" dirty="0"/>
+              <a:t>Basement Quality</a:t>
+            </a:r>
+          </a:p>
+          <a:p>
+            <a:pPr marL="285750" indent="-285750">
+              <a:buFont typeface="Arial" panose="020B0604020202020204" pitchFamily="34" charset="0"/>
+              <a:buChar char="•"/>
+            </a:pPr>
+            <a:r>
+              <a:rPr lang="en-US" sz="1200" dirty="0"/>
+              <a:t>Heating Quality</a:t>
+            </a:r>
+          </a:p>
+          <a:p>
+            <a:pPr marL="285750" indent="-285750">
+              <a:buFont typeface="Arial" panose="020B0604020202020204" pitchFamily="34" charset="0"/>
+              <a:buChar char="•"/>
+            </a:pPr>
+            <a:r>
+              <a:rPr lang="en-US" sz="1200" dirty="0"/>
+              <a:t>Kitchen Quality</a:t>
+            </a:r>
+          </a:p>
+          <a:p>
+            <a:pPr marL="285750" indent="-285750">
+              <a:buFont typeface="Arial" panose="020B0604020202020204" pitchFamily="34" charset="0"/>
+              <a:buChar char="•"/>
+            </a:pPr>
+            <a:r>
+              <a:rPr lang="en-US" sz="1200" dirty="0"/>
+              <a:t>Fireplace Quality</a:t>
+            </a:r>
+          </a:p>
+          <a:p>
+            <a:pPr marL="285750" indent="-285750">
+              <a:buFont typeface="Arial" panose="020B0604020202020204" pitchFamily="34" charset="0"/>
+              <a:buChar char="•"/>
+            </a:pPr>
+            <a:r>
+              <a:rPr lang="en-US" sz="1200" dirty="0"/>
+              <a:t>Functional</a:t>
+            </a:r>
+          </a:p>
+        </p:txBody>
+      </p:sp>
+      <p:sp>
+        <p:nvSpPr>
+          <p:cNvPr id="9" name="Rounded Rectangle 8">
+            <a:extLst>
+              <a:ext uri="{FF2B5EF4-FFF2-40B4-BE49-F238E27FC236}">
+                <a16:creationId xmlns:a16="http://schemas.microsoft.com/office/drawing/2014/main" id="{F8B1B0B0-8B1A-B4C0-5A8B-5680479C57CF}"/>
+              </a:ext>
+            </a:extLst>
+          </p:cNvPr>
+          <p:cNvSpPr/>
+          <p:nvPr/>
+        </p:nvSpPr>
+        <p:spPr>
+          <a:xfrm>
+            <a:off x="4309292" y="3428999"/>
+            <a:ext cx="2682945" cy="3136605"/>
+          </a:xfrm>
+          <a:prstGeom prst="roundRect">
+            <a:avLst/>
+          </a:prstGeom>
+          <a:solidFill>
+            <a:schemeClr val="accent6"/>
+          </a:solidFill>
+          <a:ln>
+            <a:solidFill>
+              <a:schemeClr val="bg1"/>
+            </a:solidFill>
+          </a:ln>
+        </p:spPr>
+        <p:style>
+          <a:lnRef idx="2">
+            <a:schemeClr val="accent1">
+              <a:shade val="15000"/>
+            </a:schemeClr>
+          </a:lnRef>
+          <a:fillRef idx="1">
+            <a:schemeClr val="accent1"/>
+          </a:fillRef>
+          <a:effectRef idx="0">
+            <a:schemeClr val="accent1"/>
+          </a:effectRef>
+          <a:fontRef idx="minor">
+            <a:schemeClr val="lt1"/>
+          </a:fontRef>
+        </p:style>
+        <p:txBody>
+          <a:bodyPr rtlCol="0" anchor="t"/>
+          <a:lstStyle/>
+          <a:p>
+            <a:pPr algn="ctr"/>
+            <a:r>
+              <a:rPr lang="en-US" sz="1400" dirty="0"/>
               <a:t>One-Hot Encoded 13 Features </a:t>
             </a:r>
           </a:p>
@@ -12055,6 +12055,163 @@
               <a:buChar char="•"/>
             </a:pPr>
             <a:endParaRPr lang="en-US" sz="1200" dirty="0"/>
+          </a:p>
+        </p:txBody>
+      </p:sp>
+      <p:sp>
+        <p:nvSpPr>
+          <p:cNvPr id="12" name="Rounded Rectangle 11">
+            <a:extLst>
+              <a:ext uri="{FF2B5EF4-FFF2-40B4-BE49-F238E27FC236}">
+                <a16:creationId xmlns:a16="http://schemas.microsoft.com/office/drawing/2014/main" id="{AF0B9E90-3F9A-6BBC-6D91-588FA2AF300F}"/>
+              </a:ext>
+            </a:extLst>
+          </p:cNvPr>
+          <p:cNvSpPr/>
+          <p:nvPr/>
+        </p:nvSpPr>
+        <p:spPr>
+          <a:xfrm>
+            <a:off x="7270702" y="3428998"/>
+            <a:ext cx="2682945" cy="3136605"/>
+          </a:xfrm>
+          <a:prstGeom prst="roundRect">
+            <a:avLst/>
+          </a:prstGeom>
+          <a:solidFill>
+            <a:schemeClr val="accent6"/>
+          </a:solidFill>
+          <a:ln>
+            <a:solidFill>
+              <a:schemeClr val="bg1"/>
+            </a:solidFill>
+          </a:ln>
+        </p:spPr>
+        <p:style>
+          <a:lnRef idx="2">
+            <a:schemeClr val="accent1">
+              <a:shade val="15000"/>
+            </a:schemeClr>
+          </a:lnRef>
+          <a:fillRef idx="1">
+            <a:schemeClr val="accent1"/>
+          </a:fillRef>
+          <a:effectRef idx="0">
+            <a:schemeClr val="accent1"/>
+          </a:effectRef>
+          <a:fontRef idx="minor">
+            <a:schemeClr val="lt1"/>
+          </a:fontRef>
+        </p:style>
+        <p:txBody>
+          <a:bodyPr rtlCol="0" anchor="t"/>
+          <a:lstStyle/>
+          <a:p>
+            <a:pPr algn="ctr"/>
+            <a:r>
+              <a:rPr lang="en-US" sz="1400" dirty="0"/>
+              <a:t>Engineered 10 Features</a:t>
+            </a:r>
+          </a:p>
+          <a:p>
+            <a:pPr marL="285750" indent="-285750">
+              <a:buFont typeface="Arial" panose="020B0604020202020204" pitchFamily="34" charset="0"/>
+              <a:buChar char="•"/>
+            </a:pPr>
+            <a:r>
+              <a:rPr lang="en-US" sz="1200" dirty="0"/>
+              <a:t>Quality x Square Feet</a:t>
+            </a:r>
+          </a:p>
+          <a:p>
+            <a:pPr marL="285750" indent="-285750">
+              <a:buFont typeface="Arial" panose="020B0604020202020204" pitchFamily="34" charset="0"/>
+              <a:buChar char="•"/>
+            </a:pPr>
+            <a:r>
+              <a:rPr lang="en-US" sz="1200" dirty="0"/>
+              <a:t>Sale Date (Yr Sold + Mo Sold)</a:t>
+            </a:r>
+          </a:p>
+          <a:p>
+            <a:pPr marL="285750" indent="-285750">
+              <a:buFont typeface="Arial" panose="020B0604020202020204" pitchFamily="34" charset="0"/>
+              <a:buChar char="•"/>
+            </a:pPr>
+            <a:r>
+              <a:rPr lang="en-US" sz="1200" dirty="0"/>
+              <a:t>House Age</a:t>
+            </a:r>
+          </a:p>
+          <a:p>
+            <a:pPr marL="285750" indent="-285750">
+              <a:buFont typeface="Arial" panose="020B0604020202020204" pitchFamily="34" charset="0"/>
+              <a:buChar char="•"/>
+            </a:pPr>
+            <a:r>
+              <a:rPr lang="en-US" sz="1200" dirty="0"/>
+              <a:t>Remodel Age</a:t>
+            </a:r>
+          </a:p>
+          <a:p>
+            <a:pPr marL="285750" indent="-285750">
+              <a:buFont typeface="Arial" panose="020B0604020202020204" pitchFamily="34" charset="0"/>
+              <a:buChar char="•"/>
+            </a:pPr>
+            <a:r>
+              <a:rPr lang="en-US" sz="1200" dirty="0"/>
+              <a:t>Age Bucket</a:t>
+            </a:r>
+          </a:p>
+          <a:p>
+            <a:pPr marL="285750" indent="-285750">
+              <a:buFont typeface="Arial" panose="020B0604020202020204" pitchFamily="34" charset="0"/>
+              <a:buChar char="•"/>
+            </a:pPr>
+            <a:r>
+              <a:rPr lang="en-US" sz="1200" dirty="0"/>
+              <a:t>Total Square Feet</a:t>
+            </a:r>
+          </a:p>
+          <a:p>
+            <a:pPr marL="285750" indent="-285750">
+              <a:buFont typeface="Arial" panose="020B0604020202020204" pitchFamily="34" charset="0"/>
+              <a:buChar char="•"/>
+            </a:pPr>
+            <a:r>
+              <a:rPr lang="en-US" sz="1200" dirty="0"/>
+              <a:t>Total Square Feet w/ Garage</a:t>
+            </a:r>
+          </a:p>
+          <a:p>
+            <a:pPr marL="285750" indent="-285750">
+              <a:buFont typeface="Arial" panose="020B0604020202020204" pitchFamily="34" charset="0"/>
+              <a:buChar char="•"/>
+            </a:pPr>
+            <a:r>
+              <a:rPr lang="en-US" sz="1200" dirty="0"/>
+              <a:t>Total Baths</a:t>
+            </a:r>
+          </a:p>
+          <a:p>
+            <a:pPr marL="285750" indent="-285750">
+              <a:buFont typeface="Arial" panose="020B0604020202020204" pitchFamily="34" charset="0"/>
+              <a:buChar char="•"/>
+            </a:pPr>
+            <a:r>
+              <a:rPr lang="en-US" sz="1200" dirty="0"/>
+              <a:t>Price per Square Feet</a:t>
+            </a:r>
+          </a:p>
+          <a:p>
+            <a:pPr marL="285750" indent="-285750">
+              <a:buFont typeface="Arial" panose="020B0604020202020204" pitchFamily="34" charset="0"/>
+              <a:buChar char="•"/>
+            </a:pPr>
+            <a:r>
+              <a:rPr lang="en-US" sz="1200" dirty="0"/>
+              <a:t>Season Sold</a:t>
+            </a:r>
           </a:p>
         </p:txBody>
       </p:sp>

</xml_diff>